<commit_message>
[Tutorial-2018-INDIN] Updates powerpoint, adds pdf
</commit_message>
<xml_diff>
--- a/Tutorial-2018-INDIN/Clava-Tutorial.pptx
+++ b/Tutorial-2018-INDIN/Clava-Tutorial.pptx
@@ -168,13 +168,13 @@
             <p14:sldId id="478"/>
             <p14:sldId id="462"/>
             <p14:sldId id="430"/>
-            <p14:sldId id="445"/>
-            <p14:sldId id="444"/>
-            <p14:sldId id="424"/>
           </p14:sldIdLst>
         </p14:section>
         <p14:section name="Backup" id="{4FB6FABA-96AC-493F-AB5C-3ECE333F106A}">
           <p14:sldIdLst>
+            <p14:sldId id="445"/>
+            <p14:sldId id="444"/>
+            <p14:sldId id="424"/>
             <p14:sldId id="474"/>
             <p14:sldId id="475"/>
           </p14:sldIdLst>
@@ -289,7 +289,7 @@
           <a:p>
             <a:fld id="{66AE5350-AC3F-450D-9BE8-FD18FF5D5C25}" type="datetimeFigureOut">
               <a:rPr lang="pt-PT" smtClean="0"/>
-              <a:t>17/07/2018</a:t>
+              <a:t>18/07/2018</a:t>
             </a:fld>
             <a:endParaRPr lang="pt-PT"/>
           </a:p>
@@ -1110,34 +1110,17 @@
           <a:p>
             <a:r>
               <a:rPr lang="en-US" dirty="0" smtClean="0"/>
-              <a:t>NOTE</a:t>
-            </a:r>
-            <a:r>
-              <a:rPr lang="en-US" dirty="0" smtClean="0"/>
-              <a:t>: printing the report uses</a:t>
+              <a:t>NOTE: printing the report uses</a:t>
             </a:r>
             <a:r>
               <a:rPr lang="en-US" baseline="0" dirty="0" smtClean="0"/>
-              <a:t> JS, mention how JS can help in </a:t>
-            </a:r>
+              <a:t> JS, mention how JS can help in aspects</a:t>
+            </a:r>
+          </a:p>
+          <a:p>
             <a:r>
               <a:rPr lang="en-US" baseline="0" dirty="0" smtClean="0"/>
-              <a:t>aspects</a:t>
-            </a:r>
-            <a:endParaRPr lang="en-US" baseline="0" dirty="0" smtClean="0"/>
-          </a:p>
-          <a:p>
-            <a:r>
-              <a:rPr lang="en-US" baseline="0" dirty="0" smtClean="0"/>
-              <a:t>NOTE: explain how this could be extended with other points and attributes and segue into the </a:t>
-            </a:r>
-            <a:r>
-              <a:rPr lang="en-US" baseline="0" dirty="0" smtClean="0"/>
-              <a:t>language specs </a:t>
-            </a:r>
-            <a:r>
-              <a:rPr lang="en-US" baseline="0" dirty="0" smtClean="0"/>
-              <a:t>docs</a:t>
+              <a:t>NOTE: explain how this could be extended with other points and attributes and segue into the language specs docs</a:t>
             </a:r>
             <a:endParaRPr lang="en-US" dirty="0"/>
           </a:p>
@@ -1320,11 +1303,7 @@
           <a:p>
             <a:r>
               <a:rPr lang="en-US" dirty="0" smtClean="0"/>
-              <a:t>NOTE</a:t>
-            </a:r>
-            <a:r>
-              <a:rPr lang="en-US" dirty="0" smtClean="0"/>
-              <a:t>: present and explain </a:t>
+              <a:t>NOTE: present and explain </a:t>
             </a:r>
             <a:r>
               <a:rPr lang="en-US" dirty="0" err="1" smtClean="0"/>
@@ -1340,11 +1319,7 @@
             </a:r>
             <a:r>
               <a:rPr lang="en-US" dirty="0" smtClean="0"/>
-              <a:t>reuse, </a:t>
-            </a:r>
-            <a:r>
-              <a:rPr lang="en-US" dirty="0" smtClean="0"/>
-              <a:t>efficiency</a:t>
+              <a:t>reuse, efficiency</a:t>
             </a:r>
           </a:p>
           <a:p>
@@ -1530,11 +1505,7 @@
           <a:p>
             <a:r>
               <a:rPr lang="en-US" dirty="0" smtClean="0"/>
-              <a:t>NOTE</a:t>
-            </a:r>
-            <a:r>
-              <a:rPr lang="en-US" dirty="0" smtClean="0"/>
-              <a:t>: explain imports (user and Clava)</a:t>
+              <a:t>NOTE: explain imports (user and Clava)</a:t>
             </a:r>
           </a:p>
           <a:p>
@@ -1570,11 +1541,7 @@
             </a:r>
             <a:r>
               <a:rPr lang="en-US" dirty="0" smtClean="0"/>
-              <a:t> </a:t>
-            </a:r>
-            <a:r>
-              <a:rPr lang="en-US" dirty="0" smtClean="0"/>
-              <a:t>Docs</a:t>
+              <a:t> Docs</a:t>
             </a:r>
           </a:p>
           <a:p>
@@ -1836,11 +1803,7 @@
           <a:p>
             <a:r>
               <a:rPr lang="en-US" dirty="0" smtClean="0"/>
-              <a:t>NOTE: API allows us to abstract from target language, show C and C++ generated </a:t>
-            </a:r>
-            <a:r>
-              <a:rPr lang="en-US" dirty="0" smtClean="0"/>
-              <a:t>code, also</a:t>
+              <a:t>NOTE: API allows us to abstract from target language, show C and C++ generated code, also</a:t>
             </a:r>
             <a:r>
               <a:rPr lang="en-US" baseline="0" dirty="0" smtClean="0"/>
@@ -1859,15 +1822,7 @@
             </a:r>
             <a:r>
               <a:rPr lang="en-US" dirty="0" smtClean="0"/>
-              <a:t> case where this exact aspect can be used in Java (</a:t>
-            </a:r>
-            <a:r>
-              <a:rPr lang="en-US" dirty="0" smtClean="0"/>
-              <a:t>go </a:t>
-            </a:r>
-            <a:r>
-              <a:rPr lang="en-US" dirty="0" smtClean="0"/>
-              <a:t>to </a:t>
+              <a:t> case where this exact aspect can be used in Java (go to </a:t>
             </a:r>
             <a:r>
               <a:rPr lang="en-US" dirty="0" err="1" smtClean="0"/>
@@ -1988,11 +1943,7 @@
           <a:p>
             <a:r>
               <a:rPr lang="en-US" dirty="0" smtClean="0"/>
-              <a:t>NOTE: </a:t>
-            </a:r>
-            <a:r>
-              <a:rPr lang="en-US" dirty="0" smtClean="0"/>
-              <a:t>stress this returns a function join point, which can be used with all aspects we've seen so far</a:t>
+              <a:t>NOTE: stress this returns a function join point, which can be used with all aspects we've seen so far</a:t>
             </a:r>
           </a:p>
           <a:p>
@@ -2086,15 +2037,7 @@
           <a:p>
             <a:r>
               <a:rPr lang="en-US" dirty="0" smtClean="0"/>
-              <a:t>NOTE</a:t>
-            </a:r>
-            <a:r>
-              <a:rPr lang="en-US" dirty="0" smtClean="0"/>
-              <a:t>: stress that analysis is performed automatically and the library decides what and how to </a:t>
-            </a:r>
-            <a:r>
-              <a:rPr lang="en-US" dirty="0" smtClean="0"/>
-              <a:t>parallelize</a:t>
+              <a:t>NOTE: stress that analysis is performed automatically and the library decides what and how to parallelize</a:t>
             </a:r>
           </a:p>
           <a:p>
@@ -3970,13 +3913,7 @@
               <a:rPr lang="en-US" altLang="en-US" dirty="0" smtClean="0">
                 <a:ea typeface="ＭＳ Ｐゴシック" pitchFamily="34" charset="-128"/>
               </a:rPr>
-              <a:t>- Weaving </a:t>
-            </a:r>
-            <a:r>
-              <a:rPr lang="en-US" altLang="en-US" dirty="0" smtClean="0">
-                <a:ea typeface="ＭＳ Ｐゴシック" pitchFamily="34" charset="-128"/>
-              </a:rPr>
-              <a:t>engine responsible to target a specific language</a:t>
+              <a:t>- Weaving engine responsible to target a specific language</a:t>
             </a:r>
             <a:endParaRPr lang="en-US" altLang="en-US" noProof="0" dirty="0" smtClean="0">
               <a:ea typeface="ＭＳ Ｐゴシック" pitchFamily="34" charset="-128"/>
@@ -4553,7 +4490,7 @@
           <a:p>
             <a:fld id="{0880A5D9-4097-4A6C-8088-0841273FE47A}" type="datetime1">
               <a:rPr lang="pt-PT" smtClean="0"/>
-              <a:t>17/07/2018</a:t>
+              <a:t>18/07/2018</a:t>
             </a:fld>
             <a:endParaRPr lang="pt-PT"/>
           </a:p>
@@ -4723,7 +4660,7 @@
           <a:p>
             <a:fld id="{5321D5B1-B843-4CEB-B5BF-0E0325A81FBE}" type="datetime1">
               <a:rPr lang="pt-PT" smtClean="0"/>
-              <a:t>17/07/2018</a:t>
+              <a:t>18/07/2018</a:t>
             </a:fld>
             <a:endParaRPr lang="pt-PT"/>
           </a:p>
@@ -4903,7 +4840,7 @@
           <a:p>
             <a:fld id="{6700CC93-6365-4109-81E9-C756FF5E382B}" type="datetime1">
               <a:rPr lang="pt-PT" smtClean="0"/>
-              <a:t>17/07/2018</a:t>
+              <a:t>18/07/2018</a:t>
             </a:fld>
             <a:endParaRPr lang="pt-PT"/>
           </a:p>
@@ -5073,7 +5010,7 @@
           <a:p>
             <a:fld id="{1F0AD53C-67ED-41F4-B8B4-46B74DB9B88E}" type="datetime1">
               <a:rPr lang="pt-PT" smtClean="0"/>
-              <a:t>17/07/2018</a:t>
+              <a:t>18/07/2018</a:t>
             </a:fld>
             <a:endParaRPr lang="pt-PT"/>
           </a:p>
@@ -5338,7 +5275,7 @@
           <a:p>
             <a:fld id="{95A3DF60-08F3-423F-BC2C-5A39B101E248}" type="datetime1">
               <a:rPr lang="pt-PT" smtClean="0"/>
-              <a:t>17/07/2018</a:t>
+              <a:t>18/07/2018</a:t>
             </a:fld>
             <a:endParaRPr lang="pt-PT"/>
           </a:p>
@@ -5577,7 +5514,7 @@
           <a:p>
             <a:fld id="{D22F3CE2-7CA6-418F-86FA-715C1A17D2FE}" type="datetime1">
               <a:rPr lang="pt-PT" smtClean="0"/>
-              <a:t>17/07/2018</a:t>
+              <a:t>18/07/2018</a:t>
             </a:fld>
             <a:endParaRPr lang="pt-PT"/>
           </a:p>
@@ -5944,7 +5881,7 @@
           <a:p>
             <a:fld id="{C768C065-5A09-4F5D-93F7-27A7FE0A18C6}" type="datetime1">
               <a:rPr lang="pt-PT" smtClean="0"/>
-              <a:t>17/07/2018</a:t>
+              <a:t>18/07/2018</a:t>
             </a:fld>
             <a:endParaRPr lang="pt-PT"/>
           </a:p>
@@ -6062,7 +5999,7 @@
           <a:p>
             <a:fld id="{3629EFB8-4EDE-4888-8F14-1A56D2237630}" type="datetime1">
               <a:rPr lang="pt-PT" smtClean="0"/>
-              <a:t>17/07/2018</a:t>
+              <a:t>18/07/2018</a:t>
             </a:fld>
             <a:endParaRPr lang="pt-PT"/>
           </a:p>
@@ -6157,7 +6094,7 @@
           <a:p>
             <a:fld id="{250FF9E8-EEF6-4D9F-A0F4-85C3FCE92D05}" type="datetime1">
               <a:rPr lang="pt-PT" smtClean="0"/>
-              <a:t>17/07/2018</a:t>
+              <a:t>18/07/2018</a:t>
             </a:fld>
             <a:endParaRPr lang="pt-PT"/>
           </a:p>
@@ -6434,7 +6371,7 @@
           <a:p>
             <a:fld id="{677FAEAC-3DCA-4F73-99D8-9EBA4021D811}" type="datetime1">
               <a:rPr lang="pt-PT" smtClean="0"/>
-              <a:t>17/07/2018</a:t>
+              <a:t>18/07/2018</a:t>
             </a:fld>
             <a:endParaRPr lang="pt-PT"/>
           </a:p>
@@ -6691,7 +6628,7 @@
           <a:p>
             <a:fld id="{2A6A5DB0-2047-4E92-A27F-4E2C282137CB}" type="datetime1">
               <a:rPr lang="pt-PT" smtClean="0"/>
-              <a:t>17/07/2018</a:t>
+              <a:t>18/07/2018</a:t>
             </a:fld>
             <a:endParaRPr lang="pt-PT"/>
           </a:p>
@@ -6904,7 +6841,7 @@
           <a:p>
             <a:fld id="{2AD45C63-42A9-4CCA-AA89-802A76D98AB4}" type="datetime1">
               <a:rPr lang="pt-PT" smtClean="0"/>
-              <a:t>17/07/2018</a:t>
+              <a:t>18/07/2018</a:t>
             </a:fld>
             <a:endParaRPr lang="pt-PT"/>
           </a:p>
@@ -7515,12 +7452,6 @@
               </a:rPr>
               <a:t>2018-07-18 – INDIN 2018</a:t>
             </a:r>
-            <a:endParaRPr lang="pt-PT" dirty="0" smtClean="0">
-              <a:solidFill>
-                <a:srgbClr val="757575"/>
-              </a:solidFill>
-              <a:latin typeface="Open Sans"/>
-            </a:endParaRPr>
           </a:p>
         </p:txBody>
       </p:sp>
@@ -11241,11 +11172,7 @@
             </a:r>
             <a:r>
               <a:rPr lang="en-US" dirty="0" smtClean="0"/>
-              <a:t> </a:t>
-            </a:r>
-            <a:r>
-              <a:rPr lang="en-US" dirty="0" smtClean="0"/>
-              <a:t>is a </a:t>
+              <a:t> is a </a:t>
             </a:r>
             <a:r>
               <a:rPr lang="en-US" b="1" dirty="0" smtClean="0"/>
@@ -11253,25 +11180,16 @@
             </a:r>
             <a:r>
               <a:rPr lang="en-US" dirty="0" smtClean="0"/>
-              <a:t> </a:t>
-            </a:r>
-            <a:r>
-              <a:rPr lang="en-US" dirty="0" smtClean="0"/>
-              <a:t>C/C++ compiler </a:t>
-            </a:r>
+              <a:t> C/C++ compiler </a:t>
+            </a:r>
+          </a:p>
+          <a:p>
             <a:endParaRPr lang="en-US" dirty="0" smtClean="0"/>
           </a:p>
           <a:p>
-            <a:endParaRPr lang="en-US" dirty="0" smtClean="0"/>
-          </a:p>
-          <a:p>
             <a:r>
               <a:rPr lang="en-US" b="1" dirty="0" smtClean="0"/>
-              <a:t>Strategy </a:t>
-            </a:r>
-            <a:r>
-              <a:rPr lang="en-US" b="1" dirty="0" smtClean="0"/>
-              <a:t>reusability</a:t>
+              <a:t>Strategy reusability</a:t>
             </a:r>
             <a:r>
               <a:rPr lang="en-US" dirty="0" smtClean="0"/>
@@ -11288,15 +11206,7 @@
             </a:r>
             <a:r>
               <a:rPr lang="en-US" dirty="0" smtClean="0"/>
-              <a:t>, structural/syntactic </a:t>
-            </a:r>
-            <a:r>
-              <a:rPr lang="en-US" dirty="0" smtClean="0"/>
-              <a:t>points </a:t>
-            </a:r>
-            <a:r>
-              <a:rPr lang="en-US" dirty="0" smtClean="0"/>
-              <a:t>with </a:t>
+              <a:t>, structural/syntactic points with </a:t>
             </a:r>
             <a:r>
               <a:rPr lang="en-US" b="1" dirty="0" smtClean="0"/>
@@ -13788,7 +13698,6 @@
               <a:rPr lang="en-US" altLang="en-US" noProof="0" dirty="0" smtClean="0"/>
               <a:t>AOP Approach</a:t>
             </a:r>
-            <a:endParaRPr lang="en-US" altLang="en-US" noProof="0" dirty="0" smtClean="0"/>
           </a:p>
         </p:txBody>
       </p:sp>
@@ -15199,19 +15108,7 @@
               <a:rPr lang="en-US" altLang="en-US" noProof="0" dirty="0" smtClean="0">
                 <a:ea typeface="ＭＳ Ｐゴシック" pitchFamily="34" charset="-128"/>
               </a:rPr>
-              <a:t>Strategies written separately from </a:t>
-            </a:r>
-            <a:r>
-              <a:rPr lang="en-US" altLang="en-US" noProof="0" dirty="0" smtClean="0">
-                <a:ea typeface="ＭＳ Ｐゴシック" pitchFamily="34" charset="-128"/>
-              </a:rPr>
-              <a:t>application logic </a:t>
-            </a:r>
-            <a:r>
-              <a:rPr lang="en-US" altLang="en-US" noProof="0" dirty="0" smtClean="0">
-                <a:ea typeface="ＭＳ Ｐゴシック" pitchFamily="34" charset="-128"/>
-              </a:rPr>
-              <a:t>code</a:t>
+              <a:t>Strategies written separately from application logic code</a:t>
             </a:r>
           </a:p>
           <a:p>
@@ -17174,15 +17071,7 @@
           <a:p>
             <a:r>
               <a:rPr lang="en-US" noProof="0" dirty="0" smtClean="0"/>
-              <a:t>Access </a:t>
-            </a:r>
-            <a:r>
-              <a:rPr lang="en-US" noProof="0" dirty="0" smtClean="0"/>
-              <a:t>points </a:t>
-            </a:r>
-            <a:r>
-              <a:rPr lang="en-US" noProof="0" dirty="0" smtClean="0"/>
-              <a:t>on the source code</a:t>
+              <a:t>Access points on the source code</a:t>
             </a:r>
           </a:p>
           <a:p>
@@ -17196,11 +17085,7 @@
             </a:r>
             <a:r>
               <a:rPr lang="en-US" noProof="0" dirty="0" smtClean="0"/>
-              <a:t>point </a:t>
-            </a:r>
-            <a:r>
-              <a:rPr lang="en-US" noProof="0" dirty="0" smtClean="0"/>
-              <a:t>chain</a:t>
+              <a:t>point chain</a:t>
             </a:r>
           </a:p>
           <a:p>
@@ -17217,11 +17102,7 @@
           <a:p>
             <a:r>
               <a:rPr lang="en-US" dirty="0" smtClean="0"/>
-              <a:t>Points </a:t>
-            </a:r>
-            <a:r>
-              <a:rPr lang="en-US" dirty="0" smtClean="0"/>
-              <a:t>not present in the chain are inferred</a:t>
+              <a:t>Points not present in the chain are inferred</a:t>
             </a:r>
           </a:p>
           <a:p>
@@ -17864,11 +17745,7 @@
             </a:r>
             <a:r>
               <a:rPr lang="en-US" sz="1400" dirty="0" smtClean="0"/>
-              <a:t>function{name</a:t>
-            </a:r>
-            <a:r>
-              <a:rPr lang="en-US" sz="1400" dirty="0" smtClean="0"/>
-              <a:t>==</a:t>
+              <a:t>function{name==</a:t>
             </a:r>
             <a:r>
               <a:rPr lang="en-US" sz="1400" dirty="0" smtClean="0">
@@ -18211,43 +18088,19 @@
           <a:p>
             <a:r>
               <a:rPr lang="en-US" noProof="0" dirty="0" smtClean="0"/>
-              <a:t>Iterates over the selected </a:t>
-            </a:r>
+              <a:t>Iterates over the selected points (prefixed with $) </a:t>
+            </a:r>
+          </a:p>
+          <a:p>
             <a:r>
               <a:rPr lang="en-US" noProof="0" dirty="0" smtClean="0"/>
-              <a:t>points </a:t>
-            </a:r>
-            <a:r>
-              <a:rPr lang="en-US" noProof="0" dirty="0" smtClean="0"/>
-              <a:t>(prefixed with $) </a:t>
-            </a:r>
-          </a:p>
-          <a:p>
-            <a:r>
-              <a:rPr lang="en-US" noProof="0" dirty="0" smtClean="0"/>
-              <a:t>Any </a:t>
-            </a:r>
-            <a:r>
-              <a:rPr lang="en-US" noProof="0" dirty="0" smtClean="0"/>
-              <a:t>point </a:t>
-            </a:r>
-            <a:r>
-              <a:rPr lang="en-US" noProof="0" dirty="0" smtClean="0"/>
-              <a:t>in the select statement can be accessed</a:t>
+              <a:t>Any point in the select statement can be accessed</a:t>
             </a:r>
           </a:p>
           <a:p>
             <a:r>
               <a:rPr lang="en-US" dirty="0" smtClean="0"/>
-              <a:t>Can access </a:t>
-            </a:r>
-            <a:r>
-              <a:rPr lang="en-US" dirty="0" smtClean="0"/>
-              <a:t>point </a:t>
-            </a:r>
-            <a:r>
-              <a:rPr lang="en-US" dirty="0" smtClean="0"/>
-              <a:t>attributes</a:t>
+              <a:t>Can access point attributes</a:t>
             </a:r>
             <a:endParaRPr lang="en-US" noProof="0" dirty="0" smtClean="0"/>
           </a:p>
@@ -18563,13 +18416,7 @@
               <a:rPr lang="en-US" sz="1200" dirty="0" smtClean="0">
                 <a:latin typeface="Consolas" panose="020B0609020204030204" pitchFamily="49" charset="0"/>
               </a:rPr>
-              <a:t>interchange</a:t>
-            </a:r>
-            <a:r>
-              <a:rPr lang="en-US" sz="1200" dirty="0" smtClean="0">
-                <a:latin typeface="Consolas" panose="020B0609020204030204" pitchFamily="49" charset="0"/>
-              </a:rPr>
-              <a:t>($</a:t>
+              <a:t>interchange($</a:t>
             </a:r>
             <a:r>
               <a:rPr lang="en-US" sz="1200" dirty="0" err="1" smtClean="0">

</xml_diff>